<commit_message>
meditech & bbmc urls
</commit_message>
<xml_diff>
--- a/publications/presentation-2020-07-ed-fellows/cdw-ed-fellows-2020-07.pptx
+++ b/publications/presentation-2020-07-ed-fellows/cdw-ed-fellows-2020-07.pptx
@@ -530,19 +530,11 @@
           <a:p>
             <a:r>
               <a:rPr lang="en-US" dirty="0" smtClean="0"/>
-              <a:t>We’re part </a:t>
-            </a:r>
-            <a:r>
-              <a:rPr lang="en-US" dirty="0" smtClean="0"/>
-              <a:t>of the Clinical Data Warehouse effort on</a:t>
+              <a:t>We’re part of the Clinical Data Warehouse effort on</a:t>
             </a:r>
             <a:r>
               <a:rPr lang="en-US" baseline="0" dirty="0" smtClean="0"/>
-              <a:t> </a:t>
-            </a:r>
-            <a:r>
-              <a:rPr lang="en-US" baseline="0" dirty="0" smtClean="0"/>
-              <a:t>campus.</a:t>
+              <a:t> campus.</a:t>
             </a:r>
             <a:endParaRPr lang="en-US" dirty="0"/>
           </a:p>
@@ -4386,15 +4378,7 @@
                   <a:srgbClr val="0070C0"/>
                 </a:solidFill>
               </a:rPr>
-              <a:t>Medicine </a:t>
-            </a:r>
-            <a:r>
-              <a:rPr lang="en-US" sz="4800" dirty="0" smtClean="0">
-                <a:solidFill>
-                  <a:srgbClr val="0070C0"/>
-                </a:solidFill>
-              </a:rPr>
-              <a:t>Research</a:t>
+              <a:t>Medicine Research</a:t>
             </a:r>
             <a:endParaRPr lang="en-US" sz="8800" dirty="0">
               <a:solidFill>
@@ -5599,22 +5583,14 @@
             <a:pPr lvl="1"/>
             <a:r>
               <a:rPr lang="en-US" dirty="0" smtClean="0"/>
-              <a:t>Biomedical Research </a:t>
-            </a:r>
+              <a:t>Biomedical Research Data</a:t>
+            </a:r>
+          </a:p>
+          <a:p>
+            <a:pPr lvl="1"/>
             <a:r>
               <a:rPr lang="en-US" dirty="0" smtClean="0"/>
-              <a:t>Data</a:t>
-            </a:r>
-          </a:p>
-          <a:p>
-            <a:pPr lvl="1"/>
-            <a:r>
-              <a:rPr lang="en-US" dirty="0" smtClean="0"/>
-              <a:t>Epic </a:t>
-            </a:r>
-            <a:r>
-              <a:rPr lang="en-US" dirty="0" smtClean="0"/>
-              <a:t>(in </a:t>
+              <a:t>Epic (in </a:t>
             </a:r>
             <a:r>
               <a:rPr lang="en-US" dirty="0"/>
@@ -7073,11 +7049,7 @@
           <a:p>
             <a:r>
               <a:rPr lang="en-US" dirty="0" smtClean="0"/>
-              <a:t>A one-time Meditech </a:t>
-            </a:r>
-            <a:r>
-              <a:rPr lang="en-US" dirty="0" smtClean="0"/>
-              <a:t>extract:</a:t>
+              <a:t>A one-time Meditech extract:</a:t>
             </a:r>
             <a:br>
               <a:rPr lang="en-US" dirty="0" smtClean="0"/>
@@ -7112,13 +7084,40 @@
                   <a:srgbClr val="0070C0"/>
                 </a:solidFill>
               </a:rPr>
-              <a:t> we’re happy to help structure the request</a:t>
-            </a:r>
+              <a:t> we’re happy to help structure the </a:t>
+            </a:r>
+            <a:r>
+              <a:rPr lang="en-US" dirty="0" smtClean="0">
+                <a:solidFill>
+                  <a:srgbClr val="0070C0"/>
+                </a:solidFill>
+              </a:rPr>
+              <a:t>request</a:t>
+            </a:r>
+            <a:r>
+              <a:rPr lang="en-US" dirty="0"/>
+              <a:t/>
+            </a:r>
+            <a:br>
+              <a:rPr lang="en-US" dirty="0"/>
+            </a:br>
             <a:r>
               <a:rPr lang="en-US" dirty="0" smtClean="0"/>
-              <a:t>. </a:t>
-            </a:r>
-            <a:endParaRPr lang="en-US" dirty="0"/>
+              <a:t>Meditech request: </a:t>
+            </a:r>
+            <a:r>
+              <a:rPr lang="en-US" sz="1700" dirty="0" smtClean="0">
+                <a:hlinkClick r:id="rId3"/>
+              </a:rPr>
+              <a:t>https</a:t>
+            </a:r>
+            <a:r>
+              <a:rPr lang="en-US" sz="1700" dirty="0">
+                <a:hlinkClick r:id="rId3"/>
+              </a:rPr>
+              <a:t>://ouhealth.service-now.com/sp?id=sc_cat_item&amp;sys_id=79c250c74f652300ed7229dd0210c7d9</a:t>
+            </a:r>
+            <a:endParaRPr lang="en-US" sz="1700" dirty="0"/>
           </a:p>
           <a:p>
             <a:pPr marL="228600" lvl="1">
@@ -7163,7 +7162,37 @@
                   <a:srgbClr val="0070C0"/>
                 </a:solidFill>
               </a:rPr>
-              <a:t>contact the CDW</a:t>
+              <a:t>contact the </a:t>
+            </a:r>
+            <a:r>
+              <a:rPr lang="en-US" sz="2800" dirty="0" smtClean="0">
+                <a:solidFill>
+                  <a:srgbClr val="0070C0"/>
+                </a:solidFill>
+              </a:rPr>
+              <a:t>BBMC about the CDW </a:t>
+            </a:r>
+            <a:r>
+              <a:rPr lang="en-US" sz="2800" dirty="0">
+                <a:solidFill>
+                  <a:srgbClr val="0070C0"/>
+                </a:solidFill>
+              </a:rPr>
+              <a:t>(</a:t>
+            </a:r>
+            <a:r>
+              <a:rPr lang="en-US" sz="2800" dirty="0">
+                <a:hlinkClick r:id="rId4"/>
+              </a:rPr>
+              <a:t>https://ouhsc.edu/bbmc/</a:t>
+            </a:r>
+            <a:r>
+              <a:rPr lang="en-US" sz="2800" dirty="0">
+                <a:solidFill>
+                  <a:srgbClr val="0070C0"/>
+                </a:solidFill>
+              </a:rPr>
+              <a:t>)</a:t>
             </a:r>
           </a:p>
           <a:p>
@@ -7193,8 +7222,43 @@
                   <a:srgbClr val="0070C0"/>
                 </a:solidFill>
               </a:rPr>
-              <a:t>please contact the CDW</a:t>
-            </a:r>
+              <a:t>please contact the BBMC about the </a:t>
+            </a:r>
+            <a:r>
+              <a:rPr lang="en-US" sz="2800" dirty="0" smtClean="0">
+                <a:solidFill>
+                  <a:srgbClr val="0070C0"/>
+                </a:solidFill>
+              </a:rPr>
+              <a:t>CDW</a:t>
+            </a:r>
+            <a:r>
+              <a:rPr lang="en-US" sz="2800" dirty="0">
+                <a:solidFill>
+                  <a:srgbClr val="0070C0"/>
+                </a:solidFill>
+              </a:rPr>
+              <a:t> (</a:t>
+            </a:r>
+            <a:r>
+              <a:rPr lang="en-US" sz="2800" dirty="0">
+                <a:hlinkClick r:id="rId4"/>
+              </a:rPr>
+              <a:t>https://ouhsc.edu/bbmc/</a:t>
+            </a:r>
+            <a:r>
+              <a:rPr lang="en-US" sz="2800" dirty="0">
+                <a:solidFill>
+                  <a:srgbClr val="0070C0"/>
+                </a:solidFill>
+              </a:rPr>
+              <a:t>)</a:t>
+            </a:r>
+            <a:endParaRPr lang="en-US" sz="2800" dirty="0" smtClean="0">
+              <a:solidFill>
+                <a:srgbClr val="0070C0"/>
+              </a:solidFill>
+            </a:endParaRPr>
           </a:p>
           <a:p>
             <a:pPr marL="228600" lvl="1">
@@ -7247,33 +7311,31 @@
                   <a:srgbClr val="0070C0"/>
                 </a:solidFill>
               </a:rPr>
-              <a:t>BBMC/CDW about REDCap (</a:t>
-            </a:r>
-            <a:r>
-              <a:rPr lang="en-US" sz="2800" dirty="0">
-                <a:hlinkClick r:id="rId3"/>
+              <a:t>BBMC </a:t>
+            </a:r>
+            <a:r>
+              <a:rPr lang="en-US" sz="2800">
+                <a:solidFill>
+                  <a:srgbClr val="0070C0"/>
+                </a:solidFill>
               </a:rPr>
-              <a:t>https://ouhsc.edu/bbmc</a:t>
-            </a:r>
-            <a:r>
-              <a:rPr lang="en-US" sz="2800" dirty="0" smtClean="0">
-                <a:hlinkClick r:id="rId3"/>
+              <a:t>about REDCap (</a:t>
+            </a:r>
+            <a:r>
+              <a:rPr lang="en-US" sz="2800">
+                <a:hlinkClick r:id="rId4"/>
               </a:rPr>
-              <a:t>/</a:t>
-            </a:r>
-            <a:r>
-              <a:rPr lang="en-US" sz="2800" dirty="0" smtClean="0">
+              <a:t>https://ouhsc.edu/bbmc/</a:t>
+            </a:r>
+            <a:r>
+              <a:rPr lang="en-US" sz="2800">
                 <a:solidFill>
                   <a:srgbClr val="0070C0"/>
                 </a:solidFill>
               </a:rPr>
               <a:t>)</a:t>
             </a:r>
-            <a:endParaRPr lang="en-US" sz="2800" dirty="0">
-              <a:solidFill>
-                <a:srgbClr val="0070C0"/>
-              </a:solidFill>
-            </a:endParaRPr>
+            <a:endParaRPr lang="en-US" sz="2800" dirty="0"/>
           </a:p>
           <a:p>
             <a:pPr marL="0" lvl="1" indent="0">
@@ -7282,15 +7344,6 @@
               </a:spcBef>
               <a:buNone/>
             </a:pPr>
-            <a:endParaRPr lang="en-US" sz="2800" dirty="0"/>
-          </a:p>
-          <a:p>
-            <a:pPr marL="0" lvl="1" indent="0">
-              <a:spcBef>
-                <a:spcPts val="1000"/>
-              </a:spcBef>
-              <a:buNone/>
-            </a:pPr>
             <a:r>
               <a:rPr lang="en-US" sz="2800" i="1" dirty="0" smtClean="0"/>
               <a:t>Terms</a:t>
@@ -7410,13 +7463,13 @@
             </a:r>
             <a:r>
               <a:rPr lang="en-US" sz="2400" dirty="0">
-                <a:hlinkClick r:id="rId4"/>
+                <a:hlinkClick r:id="rId5"/>
               </a:rPr>
               <a:t>https://www.project-redcap.org</a:t>
             </a:r>
             <a:r>
               <a:rPr lang="en-US" sz="2400" dirty="0" smtClean="0">
-                <a:hlinkClick r:id="rId4"/>
+                <a:hlinkClick r:id="rId5"/>
               </a:rPr>
               <a:t>/</a:t>
             </a:r>

</xml_diff>